<commit_message>
Added sources to the powerpoint and the corresponding PDF
</commit_message>
<xml_diff>
--- a/ASD/AdaptiveSoftwareDevelopment.pptx
+++ b/ASD/AdaptiveSoftwareDevelopment.pptx
@@ -11,6 +11,8 @@
     <p:sldId id="257" r:id="rId5"/>
     <p:sldId id="258" r:id="rId6"/>
     <p:sldId id="259" r:id="rId7"/>
+    <p:sldId id="262" r:id="rId8"/>
+    <p:sldId id="263" r:id="rId9"/>
   </p:sldIdLst>
   <p:sldSz cx="12192000" cy="6858000"/>
   <p:notesSz cx="6858000" cy="9144000"/>
@@ -109,6 +111,11 @@
       </a:defRPr>
     </a:lvl9pPr>
   </p:defaultTextStyle>
+  <p:extLst>
+    <p:ext uri="{EFAFB233-063F-42B5-8137-9DF3F51BA10A}">
+      <p15:sldGuideLst xmlns:p15="http://schemas.microsoft.com/office/powerpoint/2012/main"/>
+    </p:ext>
+  </p:extLst>
 </p:presentation>
 </file>
 
@@ -207,7 +214,7 @@
           <a:effectLst/>
           <a:extLst>
             <a:ext uri="{91240B29-F687-4f45-9708-019B960494DF}">
-              <a14:hiddenLine xmlns:a14="http://schemas.microsoft.com/office/drawing/2010/main" xmlns="" w="9525">
+              <a14:hiddenLine xmlns="" xmlns:a14="http://schemas.microsoft.com/office/drawing/2010/main" w="9525">
                 <a:solidFill>
                   <a:srgbClr val="000000"/>
                 </a:solidFill>
@@ -1717,7 +1724,7 @@
           <a:ln/>
           <a:extLst>
             <a:ext uri="{91240B29-F687-4f45-9708-019B960494DF}">
-              <a14:hiddenLine xmlns:a14="http://schemas.microsoft.com/office/drawing/2010/main" xmlns="" w="9525">
+              <a14:hiddenLine xmlns="" xmlns:a14="http://schemas.microsoft.com/office/drawing/2010/main" w="9525">
                 <a:solidFill>
                   <a:srgbClr val="000000"/>
                 </a:solidFill>
@@ -1989,7 +1996,7 @@
           <a:ln/>
           <a:extLst>
             <a:ext uri="{91240B29-F687-4f45-9708-019B960494DF}">
-              <a14:hiddenLine xmlns:a14="http://schemas.microsoft.com/office/drawing/2010/main" xmlns="" w="9525">
+              <a14:hiddenLine xmlns="" xmlns:a14="http://schemas.microsoft.com/office/drawing/2010/main" w="9525">
                 <a:solidFill>
                   <a:srgbClr val="000000"/>
                 </a:solidFill>
@@ -2269,7 +2276,7 @@
           <a:ln/>
           <a:extLst>
             <a:ext uri="{91240B29-F687-4f45-9708-019B960494DF}">
-              <a14:hiddenLine xmlns:a14="http://schemas.microsoft.com/office/drawing/2010/main" xmlns="" w="9525">
+              <a14:hiddenLine xmlns="" xmlns:a14="http://schemas.microsoft.com/office/drawing/2010/main" w="9525">
                 <a:solidFill>
                   <a:srgbClr val="000000"/>
                 </a:solidFill>
@@ -2889,7 +2896,7 @@
           <a:ln/>
           <a:extLst>
             <a:ext uri="{91240B29-F687-4f45-9708-019B960494DF}">
-              <a14:hiddenLine xmlns:a14="http://schemas.microsoft.com/office/drawing/2010/main" xmlns="" w="9525">
+              <a14:hiddenLine xmlns="" xmlns:a14="http://schemas.microsoft.com/office/drawing/2010/main" w="9525">
                 <a:solidFill>
                   <a:srgbClr val="000000"/>
                 </a:solidFill>
@@ -3225,7 +3232,7 @@
           <a:ln/>
           <a:extLst>
             <a:ext uri="{91240B29-F687-4f45-9708-019B960494DF}">
-              <a14:hiddenLine xmlns:a14="http://schemas.microsoft.com/office/drawing/2010/main" xmlns="" w="9525">
+              <a14:hiddenLine xmlns="" xmlns:a14="http://schemas.microsoft.com/office/drawing/2010/main" w="9525">
                 <a:solidFill>
                   <a:srgbClr val="000000"/>
                 </a:solidFill>
@@ -3699,7 +3706,7 @@
           <a:ln/>
           <a:extLst>
             <a:ext uri="{91240B29-F687-4f45-9708-019B960494DF}">
-              <a14:hiddenLine xmlns:a14="http://schemas.microsoft.com/office/drawing/2010/main" xmlns="" w="9525">
+              <a14:hiddenLine xmlns="" xmlns:a14="http://schemas.microsoft.com/office/drawing/2010/main" w="9525">
                 <a:solidFill>
                   <a:srgbClr val="000000"/>
                 </a:solidFill>
@@ -4122,7 +4129,7 @@
           <a:ln/>
           <a:extLst>
             <a:ext uri="{91240B29-F687-4f45-9708-019B960494DF}">
-              <a14:hiddenLine xmlns:a14="http://schemas.microsoft.com/office/drawing/2010/main" xmlns="" w="9525">
+              <a14:hiddenLine xmlns="" xmlns:a14="http://schemas.microsoft.com/office/drawing/2010/main" w="9525">
                 <a:solidFill>
                   <a:srgbClr val="000000"/>
                 </a:solidFill>
@@ -6034,6 +6041,368 @@
 </p:sld>
 </file>
 
+<file path=ppt/slides/slide7.xml><?xml version="1.0" encoding="utf-8"?>
+<p:sld xmlns:a="http://schemas.openxmlformats.org/drawingml/2006/main" xmlns:r="http://schemas.openxmlformats.org/officeDocument/2006/relationships" xmlns:p="http://schemas.openxmlformats.org/presentationml/2006/main">
+  <p:cSld>
+    <p:spTree>
+      <p:nvGrpSpPr>
+        <p:cNvPr id="1" name=""/>
+        <p:cNvGrpSpPr/>
+        <p:nvPr/>
+      </p:nvGrpSpPr>
+      <p:grpSpPr>
+        <a:xfrm>
+          <a:off x="0" y="0"/>
+          <a:ext cx="0" cy="0"/>
+          <a:chOff x="0" y="0"/>
+          <a:chExt cx="0" cy="0"/>
+        </a:xfrm>
+      </p:grpSpPr>
+      <p:sp>
+        <p:nvSpPr>
+          <p:cNvPr id="2" name="Title 1"/>
+          <p:cNvSpPr>
+            <a:spLocks noGrp="1"/>
+          </p:cNvSpPr>
+          <p:nvPr>
+            <p:ph type="title"/>
+          </p:nvPr>
+        </p:nvSpPr>
+        <p:spPr/>
+        <p:txBody>
+          <a:bodyPr/>
+          <a:lstStyle/>
+          <a:p>
+            <a:r>
+              <a:rPr lang="fi-FI" dirty="0" smtClean="0"/>
+              <a:t>Pohdinta – Hyödyntäminen Kouluympäristössä</a:t>
+            </a:r>
+            <a:endParaRPr lang="fi-FI" dirty="0"/>
+          </a:p>
+        </p:txBody>
+      </p:sp>
+      <p:sp>
+        <p:nvSpPr>
+          <p:cNvPr id="3" name="Content Placeholder 2"/>
+          <p:cNvSpPr>
+            <a:spLocks noGrp="1"/>
+          </p:cNvSpPr>
+          <p:nvPr>
+            <p:ph idx="1"/>
+          </p:nvPr>
+        </p:nvSpPr>
+        <p:spPr/>
+        <p:txBody>
+          <a:bodyPr/>
+          <a:lstStyle/>
+          <a:p>
+            <a:r>
+              <a:rPr lang="fi-FI" b="1" dirty="0" smtClean="0"/>
+              <a:t>ASD</a:t>
+            </a:r>
+            <a:r>
+              <a:rPr lang="fi-FI" dirty="0" smtClean="0"/>
+              <a:t> on erittäin taipuva, sen vaatimukset ovat vähäiset, joten se soveltuu opiskeluympäristöön.</a:t>
+            </a:r>
+          </a:p>
+          <a:p>
+            <a:r>
+              <a:rPr lang="fi-FI" dirty="0" smtClean="0"/>
+              <a:t>Oppiminen vaiheena, antaa aikaa tutkia ongelmia ja oppia virheistä, jälleen vahvistaen </a:t>
+            </a:r>
+            <a:r>
+              <a:rPr lang="fi-FI" b="1" dirty="0" err="1" smtClean="0"/>
+              <a:t>ASD</a:t>
+            </a:r>
+            <a:r>
+              <a:rPr lang="fi-FI" dirty="0" err="1" smtClean="0"/>
+              <a:t>:n</a:t>
+            </a:r>
+            <a:r>
+              <a:rPr lang="fi-FI" dirty="0" smtClean="0"/>
+              <a:t> potentiaalia oppimisympäristössä.</a:t>
+            </a:r>
+          </a:p>
+          <a:p>
+            <a:r>
+              <a:rPr lang="fi-FI" dirty="0" smtClean="0"/>
+              <a:t>Ainoa valitettava seikka, on ajan hallinta. Yksi </a:t>
+            </a:r>
+            <a:r>
+              <a:rPr lang="fi-FI" b="1" dirty="0" err="1" smtClean="0"/>
+              <a:t>ASD</a:t>
+            </a:r>
+            <a:r>
+              <a:rPr lang="fi-FI" dirty="0" err="1" smtClean="0"/>
+              <a:t>:n</a:t>
+            </a:r>
+            <a:r>
+              <a:rPr lang="fi-FI" dirty="0" smtClean="0"/>
+              <a:t> riskeistä, on ajankäyttö. Projekti orientoitunut metodi voi viedä aikaa, mikäli olosuhteet eivät ole optimaaliset.</a:t>
+            </a:r>
+            <a:endParaRPr lang="fi-FI" dirty="0"/>
+          </a:p>
+        </p:txBody>
+      </p:sp>
+    </p:spTree>
+    <p:extLst>
+      <p:ext uri="{BB962C8B-B14F-4D97-AF65-F5344CB8AC3E}">
+        <p14:creationId xmlns:p14="http://schemas.microsoft.com/office/powerpoint/2010/main" val="1424091793"/>
+      </p:ext>
+    </p:extLst>
+  </p:cSld>
+  <p:clrMapOvr>
+    <a:masterClrMapping/>
+  </p:clrMapOvr>
+</p:sld>
+</file>
+
+<file path=ppt/slides/slide8.xml><?xml version="1.0" encoding="utf-8"?>
+<p:sld xmlns:a="http://schemas.openxmlformats.org/drawingml/2006/main" xmlns:r="http://schemas.openxmlformats.org/officeDocument/2006/relationships" xmlns:p="http://schemas.openxmlformats.org/presentationml/2006/main">
+  <p:cSld>
+    <p:spTree>
+      <p:nvGrpSpPr>
+        <p:cNvPr id="1" name=""/>
+        <p:cNvGrpSpPr/>
+        <p:nvPr/>
+      </p:nvGrpSpPr>
+      <p:grpSpPr>
+        <a:xfrm>
+          <a:off x="0" y="0"/>
+          <a:ext cx="0" cy="0"/>
+          <a:chOff x="0" y="0"/>
+          <a:chExt cx="0" cy="0"/>
+        </a:xfrm>
+      </p:grpSpPr>
+      <p:sp>
+        <p:nvSpPr>
+          <p:cNvPr id="2" name="Title 1"/>
+          <p:cNvSpPr>
+            <a:spLocks noGrp="1"/>
+          </p:cNvSpPr>
+          <p:nvPr>
+            <p:ph type="title"/>
+          </p:nvPr>
+        </p:nvSpPr>
+        <p:spPr/>
+        <p:txBody>
+          <a:bodyPr/>
+          <a:lstStyle/>
+          <a:p>
+            <a:r>
+              <a:rPr lang="fi-FI" dirty="0" smtClean="0"/>
+              <a:t>Lähteet</a:t>
+            </a:r>
+            <a:endParaRPr lang="fi-FI" dirty="0"/>
+          </a:p>
+        </p:txBody>
+      </p:sp>
+      <p:sp>
+        <p:nvSpPr>
+          <p:cNvPr id="3" name="Content Placeholder 2"/>
+          <p:cNvSpPr>
+            <a:spLocks noGrp="1"/>
+          </p:cNvSpPr>
+          <p:nvPr>
+            <p:ph idx="1"/>
+          </p:nvPr>
+        </p:nvSpPr>
+        <p:spPr/>
+        <p:txBody>
+          <a:bodyPr/>
+          <a:lstStyle/>
+          <a:p>
+            <a:r>
+              <a:rPr lang="en-US" u="sng" dirty="0">
+                <a:hlinkClick r:id="rId2"/>
+              </a:rPr>
+              <a:t>http://</a:t>
+            </a:r>
+            <a:r>
+              <a:rPr lang="en-US" u="sng" dirty="0" smtClean="0">
+                <a:hlinkClick r:id="rId2"/>
+              </a:rPr>
+              <a:t>www.adaptivesd.com/articles/messy.htm</a:t>
+            </a:r>
+            <a:endParaRPr lang="fi-FI" dirty="0" smtClean="0"/>
+          </a:p>
+          <a:p>
+            <a:pPr lvl="0"/>
+            <a:r>
+              <a:rPr lang="en-US" dirty="0" err="1" smtClean="0"/>
+              <a:t>Luettu</a:t>
+            </a:r>
+            <a:r>
+              <a:rPr lang="en-US" dirty="0" smtClean="0"/>
+              <a:t> 15.8.2018, </a:t>
+            </a:r>
+            <a:r>
+              <a:rPr lang="en-US" dirty="0" err="1" smtClean="0"/>
+              <a:t>avaa</a:t>
+            </a:r>
+            <a:r>
+              <a:rPr lang="en-US" dirty="0" smtClean="0"/>
+              <a:t> </a:t>
+            </a:r>
+            <a:r>
+              <a:rPr lang="en-US" b="1" dirty="0" err="1" smtClean="0"/>
+              <a:t>ASD</a:t>
+            </a:r>
+            <a:r>
+              <a:rPr lang="en-US" dirty="0" err="1" smtClean="0"/>
+              <a:t>:n</a:t>
+            </a:r>
+            <a:r>
+              <a:rPr lang="en-US" dirty="0" smtClean="0"/>
+              <a:t> </a:t>
+            </a:r>
+            <a:r>
+              <a:rPr lang="en-US" dirty="0" err="1" smtClean="0"/>
+              <a:t>taustaa</a:t>
+            </a:r>
+            <a:r>
+              <a:rPr lang="en-US" dirty="0" smtClean="0"/>
+              <a:t> ja </a:t>
+            </a:r>
+            <a:r>
+              <a:rPr lang="en-US" dirty="0" err="1" smtClean="0"/>
+              <a:t>mihin</a:t>
+            </a:r>
+            <a:r>
+              <a:rPr lang="en-US" dirty="0" smtClean="0"/>
+              <a:t> </a:t>
+            </a:r>
+            <a:r>
+              <a:rPr lang="en-US" dirty="0" err="1" smtClean="0"/>
+              <a:t>tarkoitukseen</a:t>
+            </a:r>
+            <a:r>
+              <a:rPr lang="en-US" dirty="0" smtClean="0"/>
+              <a:t> se </a:t>
+            </a:r>
+            <a:r>
+              <a:rPr lang="en-US" dirty="0" err="1" smtClean="0"/>
+              <a:t>luotiin</a:t>
+            </a:r>
+            <a:r>
+              <a:rPr lang="en-US" dirty="0" smtClean="0"/>
+              <a:t>.</a:t>
+            </a:r>
+            <a:endParaRPr lang="fi-FI" dirty="0" smtClean="0"/>
+          </a:p>
+          <a:p>
+            <a:r>
+              <a:rPr lang="en-US" u="sng" dirty="0" smtClean="0">
+                <a:hlinkClick r:id="rId3"/>
+              </a:rPr>
+              <a:t>https://en.wikipedia.org/wiki/Adaptive_software_development</a:t>
+            </a:r>
+            <a:endParaRPr lang="fi-FI" dirty="0" smtClean="0"/>
+          </a:p>
+          <a:p>
+            <a:pPr lvl="0"/>
+            <a:r>
+              <a:rPr lang="en-US" dirty="0" err="1" smtClean="0"/>
+              <a:t>Luettu</a:t>
+            </a:r>
+            <a:r>
+              <a:rPr lang="en-US" dirty="0" smtClean="0"/>
+              <a:t> </a:t>
+            </a:r>
+            <a:r>
+              <a:rPr lang="en-US" dirty="0"/>
+              <a:t>15.8.2018, </a:t>
+            </a:r>
+            <a:r>
+              <a:rPr lang="fi-FI" dirty="0" smtClean="0"/>
+              <a:t>avaa </a:t>
+            </a:r>
+            <a:r>
+              <a:rPr lang="fi-FI" b="1" dirty="0" smtClean="0"/>
+              <a:t>ASD</a:t>
+            </a:r>
+            <a:r>
+              <a:rPr lang="fi-FI" dirty="0" smtClean="0"/>
+              <a:t> historiaa ja logiikkaa.</a:t>
+            </a:r>
+            <a:endParaRPr lang="fi-FI" dirty="0"/>
+          </a:p>
+          <a:p>
+            <a:r>
+              <a:rPr lang="en-US" u="sng" dirty="0">
+                <a:hlinkClick r:id="rId4"/>
+              </a:rPr>
+              <a:t>http://www.wiki.amachu.in/index.php?title=Adaptive_Software_Development</a:t>
+            </a:r>
+            <a:endParaRPr lang="fi-FI" dirty="0"/>
+          </a:p>
+          <a:p>
+            <a:pPr lvl="0"/>
+            <a:r>
+              <a:rPr lang="en-US" dirty="0" err="1" smtClean="0"/>
+              <a:t>Luettu</a:t>
+            </a:r>
+            <a:r>
+              <a:rPr lang="en-US" dirty="0" smtClean="0"/>
+              <a:t> 15.8.2018, </a:t>
+            </a:r>
+            <a:r>
+              <a:rPr lang="en-US" dirty="0" err="1" smtClean="0"/>
+              <a:t>selvennyksiä</a:t>
+            </a:r>
+            <a:r>
+              <a:rPr lang="en-US" dirty="0" smtClean="0"/>
+              <a:t> </a:t>
+            </a:r>
+            <a:r>
+              <a:rPr lang="en-US" dirty="0" err="1" smtClean="0"/>
+              <a:t>muutamiin</a:t>
+            </a:r>
+            <a:r>
+              <a:rPr lang="en-US" dirty="0" smtClean="0"/>
+              <a:t> </a:t>
+            </a:r>
+            <a:r>
+              <a:rPr lang="en-US" dirty="0" err="1" smtClean="0"/>
+              <a:t>aspekteihin</a:t>
+            </a:r>
+            <a:r>
+              <a:rPr lang="en-US" dirty="0" smtClean="0"/>
+              <a:t>, Figure 1 </a:t>
+            </a:r>
+            <a:r>
+              <a:rPr lang="en-US" dirty="0" err="1" smtClean="0"/>
+              <a:t>lainattu</a:t>
+            </a:r>
+            <a:r>
+              <a:rPr lang="en-US" dirty="0" smtClean="0"/>
+              <a:t> </a:t>
+            </a:r>
+            <a:r>
+              <a:rPr lang="en-US" dirty="0" err="1" smtClean="0"/>
+              <a:t>heiltä</a:t>
+            </a:r>
+            <a:r>
+              <a:rPr lang="en-US" dirty="0" smtClean="0"/>
+              <a:t>.</a:t>
+            </a:r>
+            <a:endParaRPr lang="fi-FI" dirty="0"/>
+          </a:p>
+        </p:txBody>
+      </p:sp>
+    </p:spTree>
+    <p:extLst>
+      <p:ext uri="{BB962C8B-B14F-4D97-AF65-F5344CB8AC3E}">
+        <p14:creationId xmlns:p14="http://schemas.microsoft.com/office/powerpoint/2010/main" val="2609857534"/>
+      </p:ext>
+    </p:extLst>
+  </p:cSld>
+  <p:clrMapOvr>
+    <a:masterClrMapping/>
+  </p:clrMapOvr>
+</p:sld>
+</file>
+
 <file path=ppt/theme/theme1.xml><?xml version="1.0" encoding="utf-8"?>
 <a:theme xmlns:a="http://schemas.openxmlformats.org/drawingml/2006/main" name="Quotable">
   <a:themeElements>

</xml_diff>